<commit_message>
Adicionando atividade arq comp
</commit_message>
<xml_diff>
--- a/Documentação/TI-HLD-LLD.pptx
+++ b/Documentação/TI-HLD-LLD.pptx
@@ -106,6 +106,11 @@
       </a:defRPr>
     </a:lvl9pPr>
   </p:defaultTextStyle>
+  <p:extLst>
+    <p:ext uri="{EFAFB233-063F-42B5-8137-9DF3F51BA10A}">
+      <p15:sldGuideLst xmlns:p15="http://schemas.microsoft.com/office/powerpoint/2012/main"/>
+    </p:ext>
+  </p:extLst>
 </p:presentation>
 </file>
 
@@ -256,7 +261,7 @@
           <a:p>
             <a:fld id="{8F2F3937-6A12-45D8-A14D-35CF4AD6B57A}" type="datetimeFigureOut">
               <a:rPr lang="pt-BR" smtClean="0"/>
-              <a:t>25/03/2021</a:t>
+              <a:t>06/04/2021</a:t>
             </a:fld>
             <a:endParaRPr lang="pt-BR"/>
           </a:p>
@@ -454,7 +459,7 @@
           <a:p>
             <a:fld id="{8F2F3937-6A12-45D8-A14D-35CF4AD6B57A}" type="datetimeFigureOut">
               <a:rPr lang="pt-BR" smtClean="0"/>
-              <a:t>25/03/2021</a:t>
+              <a:t>06/04/2021</a:t>
             </a:fld>
             <a:endParaRPr lang="pt-BR"/>
           </a:p>
@@ -662,7 +667,7 @@
           <a:p>
             <a:fld id="{8F2F3937-6A12-45D8-A14D-35CF4AD6B57A}" type="datetimeFigureOut">
               <a:rPr lang="pt-BR" smtClean="0"/>
-              <a:t>25/03/2021</a:t>
+              <a:t>06/04/2021</a:t>
             </a:fld>
             <a:endParaRPr lang="pt-BR"/>
           </a:p>
@@ -834,7 +839,7 @@
           <a:p>
             <a:fld id="{533601A5-E338-40B6-9BFB-72CC0117273C}" type="datetimeFigureOut">
               <a:rPr lang="pt-BR" smtClean="0"/>
-              <a:t>25/03/2021</a:t>
+              <a:t>06/04/2021</a:t>
             </a:fld>
             <a:endParaRPr lang="pt-BR" dirty="0"/>
           </a:p>
@@ -1149,7 +1154,7 @@
           <a:p>
             <a:fld id="{8F2F3937-6A12-45D8-A14D-35CF4AD6B57A}" type="datetimeFigureOut">
               <a:rPr lang="pt-BR" smtClean="0"/>
-              <a:t>25/03/2021</a:t>
+              <a:t>06/04/2021</a:t>
             </a:fld>
             <a:endParaRPr lang="pt-BR"/>
           </a:p>
@@ -1424,7 +1429,7 @@
           <a:p>
             <a:fld id="{8F2F3937-6A12-45D8-A14D-35CF4AD6B57A}" type="datetimeFigureOut">
               <a:rPr lang="pt-BR" smtClean="0"/>
-              <a:t>25/03/2021</a:t>
+              <a:t>06/04/2021</a:t>
             </a:fld>
             <a:endParaRPr lang="pt-BR"/>
           </a:p>
@@ -1689,7 +1694,7 @@
           <a:p>
             <a:fld id="{8F2F3937-6A12-45D8-A14D-35CF4AD6B57A}" type="datetimeFigureOut">
               <a:rPr lang="pt-BR" smtClean="0"/>
-              <a:t>25/03/2021</a:t>
+              <a:t>06/04/2021</a:t>
             </a:fld>
             <a:endParaRPr lang="pt-BR"/>
           </a:p>
@@ -2101,7 +2106,7 @@
           <a:p>
             <a:fld id="{8F2F3937-6A12-45D8-A14D-35CF4AD6B57A}" type="datetimeFigureOut">
               <a:rPr lang="pt-BR" smtClean="0"/>
-              <a:t>25/03/2021</a:t>
+              <a:t>06/04/2021</a:t>
             </a:fld>
             <a:endParaRPr lang="pt-BR"/>
           </a:p>
@@ -2242,7 +2247,7 @@
           <a:p>
             <a:fld id="{8F2F3937-6A12-45D8-A14D-35CF4AD6B57A}" type="datetimeFigureOut">
               <a:rPr lang="pt-BR" smtClean="0"/>
-              <a:t>25/03/2021</a:t>
+              <a:t>06/04/2021</a:t>
             </a:fld>
             <a:endParaRPr lang="pt-BR"/>
           </a:p>
@@ -2355,7 +2360,7 @@
           <a:p>
             <a:fld id="{8F2F3937-6A12-45D8-A14D-35CF4AD6B57A}" type="datetimeFigureOut">
               <a:rPr lang="pt-BR" smtClean="0"/>
-              <a:t>25/03/2021</a:t>
+              <a:t>06/04/2021</a:t>
             </a:fld>
             <a:endParaRPr lang="pt-BR"/>
           </a:p>
@@ -2666,7 +2671,7 @@
           <a:p>
             <a:fld id="{8F2F3937-6A12-45D8-A14D-35CF4AD6B57A}" type="datetimeFigureOut">
               <a:rPr lang="pt-BR" smtClean="0"/>
-              <a:t>25/03/2021</a:t>
+              <a:t>06/04/2021</a:t>
             </a:fld>
             <a:endParaRPr lang="pt-BR"/>
           </a:p>
@@ -2954,7 +2959,7 @@
           <a:p>
             <a:fld id="{8F2F3937-6A12-45D8-A14D-35CF4AD6B57A}" type="datetimeFigureOut">
               <a:rPr lang="pt-BR" smtClean="0"/>
-              <a:t>25/03/2021</a:t>
+              <a:t>06/04/2021</a:t>
             </a:fld>
             <a:endParaRPr lang="pt-BR"/>
           </a:p>
@@ -3195,7 +3200,7 @@
           <a:p>
             <a:fld id="{8F2F3937-6A12-45D8-A14D-35CF4AD6B57A}" type="datetimeFigureOut">
               <a:rPr lang="pt-BR" smtClean="0"/>
-              <a:t>25/03/2021</a:t>
+              <a:t>06/04/2021</a:t>
             </a:fld>
             <a:endParaRPr lang="pt-BR"/>
           </a:p>
@@ -4267,12 +4272,57 @@
           </a:p>
         </p:txBody>
       </p:sp>
+      <p:sp>
+        <p:nvSpPr>
+          <p:cNvPr id="2" name="AutoShape 2" descr="Forest">
+            <a:extLst>
+              <a:ext uri="{FF2B5EF4-FFF2-40B4-BE49-F238E27FC236}">
+                <a16:creationId xmlns:a16="http://schemas.microsoft.com/office/drawing/2014/main" id="{D9256CCF-79BB-4D63-8D6E-4F05414EA6F8}"/>
+              </a:ext>
+            </a:extLst>
+          </p:cNvPr>
+          <p:cNvSpPr>
+            <a:spLocks noChangeAspect="1" noChangeArrowheads="1"/>
+          </p:cNvSpPr>
+          <p:nvPr/>
+        </p:nvSpPr>
+        <p:spPr bwMode="auto">
+          <a:xfrm>
+            <a:off x="5943600" y="3276600"/>
+            <a:ext cx="304800" cy="304800"/>
+          </a:xfrm>
+          <a:prstGeom prst="rect">
+            <a:avLst/>
+          </a:prstGeom>
+          <a:noFill/>
+          <a:extLst>
+            <a:ext uri="{909E8E84-426E-40DD-AFC4-6F175D3DCCD1}">
+              <a14:hiddenFill xmlns:a14="http://schemas.microsoft.com/office/drawing/2010/main">
+                <a:solidFill>
+                  <a:srgbClr val="FFFFFF"/>
+                </a:solidFill>
+              </a14:hiddenFill>
+            </a:ext>
+          </a:extLst>
+        </p:spPr>
+        <p:txBody>
+          <a:bodyPr vert="horz" wrap="square" lIns="91440" tIns="45720" rIns="91440" bIns="45720" numCol="1" anchor="t" anchorCtr="0" compatLnSpc="1">
+            <a:prstTxWarp prst="textNoShape">
+              <a:avLst/>
+            </a:prstTxWarp>
+          </a:bodyPr>
+          <a:lstStyle/>
+          <a:p>
+            <a:endParaRPr lang="pt-BR"/>
+          </a:p>
+        </p:txBody>
+      </p:sp>
       <p:pic>
         <p:nvPicPr>
-          <p:cNvPr id="6" name="Imagem 5">
-            <a:extLst>
-              <a:ext uri="{FF2B5EF4-FFF2-40B4-BE49-F238E27FC236}">
-                <a16:creationId xmlns:a16="http://schemas.microsoft.com/office/drawing/2014/main" id="{663806CF-89B6-4397-BCD9-F26A67E91363}"/>
+          <p:cNvPr id="14" name="Imagem 13">
+            <a:extLst>
+              <a:ext uri="{FF2B5EF4-FFF2-40B4-BE49-F238E27FC236}">
+                <a16:creationId xmlns:a16="http://schemas.microsoft.com/office/drawing/2014/main" id="{F21B3DEF-E0B4-4049-B41E-E7803AFCC42E}"/>
               </a:ext>
             </a:extLst>
           </p:cNvPr>
@@ -4289,8 +4339,8 @@
         </p:blipFill>
         <p:spPr>
           <a:xfrm>
-            <a:off x="340578" y="1645478"/>
-            <a:ext cx="11851422" cy="4223992"/>
+            <a:off x="342666" y="1713207"/>
+            <a:ext cx="11811468" cy="3736385"/>
           </a:xfrm>
           <a:prstGeom prst="rect">
             <a:avLst/>

</xml_diff>

<commit_message>
Subindo alterações no HLD e LLD
</commit_message>
<xml_diff>
--- a/Documentação/TI-HLD-LLD.pptx
+++ b/Documentação/TI-HLD-LLD.pptx
@@ -261,7 +261,7 @@
           <a:p>
             <a:fld id="{8F2F3937-6A12-45D8-A14D-35CF4AD6B57A}" type="datetimeFigureOut">
               <a:rPr lang="pt-BR" smtClean="0"/>
-              <a:t>06/04/2021</a:t>
+              <a:t>09/04/2021</a:t>
             </a:fld>
             <a:endParaRPr lang="pt-BR"/>
           </a:p>
@@ -459,7 +459,7 @@
           <a:p>
             <a:fld id="{8F2F3937-6A12-45D8-A14D-35CF4AD6B57A}" type="datetimeFigureOut">
               <a:rPr lang="pt-BR" smtClean="0"/>
-              <a:t>06/04/2021</a:t>
+              <a:t>09/04/2021</a:t>
             </a:fld>
             <a:endParaRPr lang="pt-BR"/>
           </a:p>
@@ -667,7 +667,7 @@
           <a:p>
             <a:fld id="{8F2F3937-6A12-45D8-A14D-35CF4AD6B57A}" type="datetimeFigureOut">
               <a:rPr lang="pt-BR" smtClean="0"/>
-              <a:t>06/04/2021</a:t>
+              <a:t>09/04/2021</a:t>
             </a:fld>
             <a:endParaRPr lang="pt-BR"/>
           </a:p>
@@ -839,7 +839,7 @@
           <a:p>
             <a:fld id="{533601A5-E338-40B6-9BFB-72CC0117273C}" type="datetimeFigureOut">
               <a:rPr lang="pt-BR" smtClean="0"/>
-              <a:t>06/04/2021</a:t>
+              <a:t>09/04/2021</a:t>
             </a:fld>
             <a:endParaRPr lang="pt-BR" dirty="0"/>
           </a:p>
@@ -1154,7 +1154,7 @@
           <a:p>
             <a:fld id="{8F2F3937-6A12-45D8-A14D-35CF4AD6B57A}" type="datetimeFigureOut">
               <a:rPr lang="pt-BR" smtClean="0"/>
-              <a:t>06/04/2021</a:t>
+              <a:t>09/04/2021</a:t>
             </a:fld>
             <a:endParaRPr lang="pt-BR"/>
           </a:p>
@@ -1429,7 +1429,7 @@
           <a:p>
             <a:fld id="{8F2F3937-6A12-45D8-A14D-35CF4AD6B57A}" type="datetimeFigureOut">
               <a:rPr lang="pt-BR" smtClean="0"/>
-              <a:t>06/04/2021</a:t>
+              <a:t>09/04/2021</a:t>
             </a:fld>
             <a:endParaRPr lang="pt-BR"/>
           </a:p>
@@ -1694,7 +1694,7 @@
           <a:p>
             <a:fld id="{8F2F3937-6A12-45D8-A14D-35CF4AD6B57A}" type="datetimeFigureOut">
               <a:rPr lang="pt-BR" smtClean="0"/>
-              <a:t>06/04/2021</a:t>
+              <a:t>09/04/2021</a:t>
             </a:fld>
             <a:endParaRPr lang="pt-BR"/>
           </a:p>
@@ -2106,7 +2106,7 @@
           <a:p>
             <a:fld id="{8F2F3937-6A12-45D8-A14D-35CF4AD6B57A}" type="datetimeFigureOut">
               <a:rPr lang="pt-BR" smtClean="0"/>
-              <a:t>06/04/2021</a:t>
+              <a:t>09/04/2021</a:t>
             </a:fld>
             <a:endParaRPr lang="pt-BR"/>
           </a:p>
@@ -2247,7 +2247,7 @@
           <a:p>
             <a:fld id="{8F2F3937-6A12-45D8-A14D-35CF4AD6B57A}" type="datetimeFigureOut">
               <a:rPr lang="pt-BR" smtClean="0"/>
-              <a:t>06/04/2021</a:t>
+              <a:t>09/04/2021</a:t>
             </a:fld>
             <a:endParaRPr lang="pt-BR"/>
           </a:p>
@@ -2360,7 +2360,7 @@
           <a:p>
             <a:fld id="{8F2F3937-6A12-45D8-A14D-35CF4AD6B57A}" type="datetimeFigureOut">
               <a:rPr lang="pt-BR" smtClean="0"/>
-              <a:t>06/04/2021</a:t>
+              <a:t>09/04/2021</a:t>
             </a:fld>
             <a:endParaRPr lang="pt-BR"/>
           </a:p>
@@ -2671,7 +2671,7 @@
           <a:p>
             <a:fld id="{8F2F3937-6A12-45D8-A14D-35CF4AD6B57A}" type="datetimeFigureOut">
               <a:rPr lang="pt-BR" smtClean="0"/>
-              <a:t>06/04/2021</a:t>
+              <a:t>09/04/2021</a:t>
             </a:fld>
             <a:endParaRPr lang="pt-BR"/>
           </a:p>
@@ -2959,7 +2959,7 @@
           <a:p>
             <a:fld id="{8F2F3937-6A12-45D8-A14D-35CF4AD6B57A}" type="datetimeFigureOut">
               <a:rPr lang="pt-BR" smtClean="0"/>
-              <a:t>06/04/2021</a:t>
+              <a:t>09/04/2021</a:t>
             </a:fld>
             <a:endParaRPr lang="pt-BR"/>
           </a:p>
@@ -3200,7 +3200,7 @@
           <a:p>
             <a:fld id="{8F2F3937-6A12-45D8-A14D-35CF4AD6B57A}" type="datetimeFigureOut">
               <a:rPr lang="pt-BR" smtClean="0"/>
-              <a:t>06/04/2021</a:t>
+              <a:t>09/04/2021</a:t>
             </a:fld>
             <a:endParaRPr lang="pt-BR"/>
           </a:p>
@@ -4319,10 +4319,10 @@
       </p:sp>
       <p:pic>
         <p:nvPicPr>
-          <p:cNvPr id="14" name="Imagem 13">
-            <a:extLst>
-              <a:ext uri="{FF2B5EF4-FFF2-40B4-BE49-F238E27FC236}">
-                <a16:creationId xmlns:a16="http://schemas.microsoft.com/office/drawing/2014/main" id="{F21B3DEF-E0B4-4049-B41E-E7803AFCC42E}"/>
+          <p:cNvPr id="6" name="Imagem 5">
+            <a:extLst>
+              <a:ext uri="{FF2B5EF4-FFF2-40B4-BE49-F238E27FC236}">
+                <a16:creationId xmlns:a16="http://schemas.microsoft.com/office/drawing/2014/main" id="{EC8B9A20-ADD3-413E-B1EB-F3C92FB16771}"/>
               </a:ext>
             </a:extLst>
           </p:cNvPr>
@@ -4339,8 +4339,8 @@
         </p:blipFill>
         <p:spPr>
           <a:xfrm>
-            <a:off x="342666" y="1713207"/>
-            <a:ext cx="11811468" cy="3736385"/>
+            <a:off x="331550" y="1586501"/>
+            <a:ext cx="11860450" cy="3846633"/>
           </a:xfrm>
           <a:prstGeom prst="rect">
             <a:avLst/>
@@ -4493,10 +4493,10 @@
       </p:sp>
       <p:pic>
         <p:nvPicPr>
-          <p:cNvPr id="7" name="Imagem 6">
-            <a:extLst>
-              <a:ext uri="{FF2B5EF4-FFF2-40B4-BE49-F238E27FC236}">
-                <a16:creationId xmlns:a16="http://schemas.microsoft.com/office/drawing/2014/main" id="{F94BE815-D2AD-40A3-A7B2-5E3339125FA0}"/>
+          <p:cNvPr id="3" name="Imagem 2">
+            <a:extLst>
+              <a:ext uri="{FF2B5EF4-FFF2-40B4-BE49-F238E27FC236}">
+                <a16:creationId xmlns:a16="http://schemas.microsoft.com/office/drawing/2014/main" id="{9E3F6D08-1800-4A09-9630-CCAF671AC651}"/>
               </a:ext>
             </a:extLst>
           </p:cNvPr>
@@ -4513,8 +4513,8 @@
         </p:blipFill>
         <p:spPr>
           <a:xfrm>
-            <a:off x="783968" y="1154096"/>
-            <a:ext cx="10624064" cy="5703904"/>
+            <a:off x="946985" y="1201000"/>
+            <a:ext cx="10298030" cy="5476025"/>
           </a:xfrm>
           <a:prstGeom prst="rect">
             <a:avLst/>

</xml_diff>

<commit_message>
Organizando arquivos e subindo APIs
</commit_message>
<xml_diff>
--- a/Documentação/TI-HLD-LLD.pptx
+++ b/Documentação/TI-HLD-LLD.pptx
@@ -7,8 +7,7 @@
   <p:sldIdLst>
     <p:sldId id="321" r:id="rId2"/>
     <p:sldId id="319" r:id="rId3"/>
-    <p:sldId id="320" r:id="rId4"/>
-    <p:sldId id="322" r:id="rId5"/>
+    <p:sldId id="322" r:id="rId4"/>
   </p:sldIdLst>
   <p:sldSz cx="12192000" cy="6858000"/>
   <p:notesSz cx="6858000" cy="9144000"/>
@@ -262,7 +261,7 @@
           <a:p>
             <a:fld id="{8F2F3937-6A12-45D8-A14D-35CF4AD6B57A}" type="datetimeFigureOut">
               <a:rPr lang="pt-BR" smtClean="0"/>
-              <a:t>19/05/2021</a:t>
+              <a:t>26/05/2021</a:t>
             </a:fld>
             <a:endParaRPr lang="pt-BR"/>
           </a:p>
@@ -460,7 +459,7 @@
           <a:p>
             <a:fld id="{8F2F3937-6A12-45D8-A14D-35CF4AD6B57A}" type="datetimeFigureOut">
               <a:rPr lang="pt-BR" smtClean="0"/>
-              <a:t>19/05/2021</a:t>
+              <a:t>26/05/2021</a:t>
             </a:fld>
             <a:endParaRPr lang="pt-BR"/>
           </a:p>
@@ -668,7 +667,7 @@
           <a:p>
             <a:fld id="{8F2F3937-6A12-45D8-A14D-35CF4AD6B57A}" type="datetimeFigureOut">
               <a:rPr lang="pt-BR" smtClean="0"/>
-              <a:t>19/05/2021</a:t>
+              <a:t>26/05/2021</a:t>
             </a:fld>
             <a:endParaRPr lang="pt-BR"/>
           </a:p>
@@ -840,7 +839,7 @@
           <a:p>
             <a:fld id="{533601A5-E338-40B6-9BFB-72CC0117273C}" type="datetimeFigureOut">
               <a:rPr lang="pt-BR" smtClean="0"/>
-              <a:t>19/05/2021</a:t>
+              <a:t>26/05/2021</a:t>
             </a:fld>
             <a:endParaRPr lang="pt-BR" dirty="0"/>
           </a:p>
@@ -1155,7 +1154,7 @@
           <a:p>
             <a:fld id="{8F2F3937-6A12-45D8-A14D-35CF4AD6B57A}" type="datetimeFigureOut">
               <a:rPr lang="pt-BR" smtClean="0"/>
-              <a:t>19/05/2021</a:t>
+              <a:t>26/05/2021</a:t>
             </a:fld>
             <a:endParaRPr lang="pt-BR"/>
           </a:p>
@@ -1430,7 +1429,7 @@
           <a:p>
             <a:fld id="{8F2F3937-6A12-45D8-A14D-35CF4AD6B57A}" type="datetimeFigureOut">
               <a:rPr lang="pt-BR" smtClean="0"/>
-              <a:t>19/05/2021</a:t>
+              <a:t>26/05/2021</a:t>
             </a:fld>
             <a:endParaRPr lang="pt-BR"/>
           </a:p>
@@ -1695,7 +1694,7 @@
           <a:p>
             <a:fld id="{8F2F3937-6A12-45D8-A14D-35CF4AD6B57A}" type="datetimeFigureOut">
               <a:rPr lang="pt-BR" smtClean="0"/>
-              <a:t>19/05/2021</a:t>
+              <a:t>26/05/2021</a:t>
             </a:fld>
             <a:endParaRPr lang="pt-BR"/>
           </a:p>
@@ -2107,7 +2106,7 @@
           <a:p>
             <a:fld id="{8F2F3937-6A12-45D8-A14D-35CF4AD6B57A}" type="datetimeFigureOut">
               <a:rPr lang="pt-BR" smtClean="0"/>
-              <a:t>19/05/2021</a:t>
+              <a:t>26/05/2021</a:t>
             </a:fld>
             <a:endParaRPr lang="pt-BR"/>
           </a:p>
@@ -2248,7 +2247,7 @@
           <a:p>
             <a:fld id="{8F2F3937-6A12-45D8-A14D-35CF4AD6B57A}" type="datetimeFigureOut">
               <a:rPr lang="pt-BR" smtClean="0"/>
-              <a:t>19/05/2021</a:t>
+              <a:t>26/05/2021</a:t>
             </a:fld>
             <a:endParaRPr lang="pt-BR"/>
           </a:p>
@@ -2361,7 +2360,7 @@
           <a:p>
             <a:fld id="{8F2F3937-6A12-45D8-A14D-35CF4AD6B57A}" type="datetimeFigureOut">
               <a:rPr lang="pt-BR" smtClean="0"/>
-              <a:t>19/05/2021</a:t>
+              <a:t>26/05/2021</a:t>
             </a:fld>
             <a:endParaRPr lang="pt-BR"/>
           </a:p>
@@ -2672,7 +2671,7 @@
           <a:p>
             <a:fld id="{8F2F3937-6A12-45D8-A14D-35CF4AD6B57A}" type="datetimeFigureOut">
               <a:rPr lang="pt-BR" smtClean="0"/>
-              <a:t>19/05/2021</a:t>
+              <a:t>26/05/2021</a:t>
             </a:fld>
             <a:endParaRPr lang="pt-BR"/>
           </a:p>
@@ -2960,7 +2959,7 @@
           <a:p>
             <a:fld id="{8F2F3937-6A12-45D8-A14D-35CF4AD6B57A}" type="datetimeFigureOut">
               <a:rPr lang="pt-BR" smtClean="0"/>
-              <a:t>19/05/2021</a:t>
+              <a:t>26/05/2021</a:t>
             </a:fld>
             <a:endParaRPr lang="pt-BR"/>
           </a:p>
@@ -3201,7 +3200,7 @@
           <a:p>
             <a:fld id="{8F2F3937-6A12-45D8-A14D-35CF4AD6B57A}" type="datetimeFigureOut">
               <a:rPr lang="pt-BR" smtClean="0"/>
-              <a:t>19/05/2021</a:t>
+              <a:t>26/05/2021</a:t>
             </a:fld>
             <a:endParaRPr lang="pt-BR"/>
           </a:p>
@@ -4365,180 +4364,6 @@
 </file>
 
 <file path=ppt/slides/slide3.xml><?xml version="1.0" encoding="utf-8"?>
-<p:sld xmlns:a="http://schemas.openxmlformats.org/drawingml/2006/main" xmlns:r="http://schemas.openxmlformats.org/officeDocument/2006/relationships" xmlns:p="http://schemas.openxmlformats.org/presentationml/2006/main">
-  <p:cSld>
-    <p:spTree>
-      <p:nvGrpSpPr>
-        <p:cNvPr id="1" name=""/>
-        <p:cNvGrpSpPr/>
-        <p:nvPr/>
-      </p:nvGrpSpPr>
-      <p:grpSpPr>
-        <a:xfrm>
-          <a:off x="0" y="0"/>
-          <a:ext cx="0" cy="0"/>
-          <a:chOff x="0" y="0"/>
-          <a:chExt cx="0" cy="0"/>
-        </a:xfrm>
-      </p:grpSpPr>
-      <p:sp>
-        <p:nvSpPr>
-          <p:cNvPr id="4" name="Título 1">
-            <a:extLst>
-              <a:ext uri="{FF2B5EF4-FFF2-40B4-BE49-F238E27FC236}">
-                <a16:creationId xmlns:a16="http://schemas.microsoft.com/office/drawing/2014/main" id="{A3808290-967C-4EBA-AC3C-34874E4DFDE7}"/>
-              </a:ext>
-            </a:extLst>
-          </p:cNvPr>
-          <p:cNvSpPr txBox="1">
-            <a:spLocks/>
-          </p:cNvSpPr>
-          <p:nvPr/>
-        </p:nvSpPr>
-        <p:spPr>
-          <a:xfrm>
-            <a:off x="1302707" y="-194424"/>
-            <a:ext cx="9586586" cy="1667273"/>
-          </a:xfrm>
-          <a:prstGeom prst="rect">
-            <a:avLst/>
-          </a:prstGeom>
-        </p:spPr>
-        <p:txBody>
-          <a:bodyPr vert="horz" lIns="91440" tIns="45720" rIns="91440" bIns="45720" rtlCol="0" anchor="ctr">
-            <a:normAutofit/>
-          </a:bodyPr>
-          <a:lstStyle>
-            <a:lvl1pPr algn="l" defTabSz="914435" rtl="0" eaLnBrk="1" latinLnBrk="0" hangingPunct="1">
-              <a:lnSpc>
-                <a:spcPct val="90000"/>
-              </a:lnSpc>
-              <a:spcBef>
-                <a:spcPct val="0"/>
-              </a:spcBef>
-              <a:buNone/>
-              <a:defRPr sz="4400" kern="1200">
-                <a:solidFill>
-                  <a:schemeClr val="tx1"/>
-                </a:solidFill>
-                <a:latin typeface="+mj-lt"/>
-                <a:ea typeface="+mj-ea"/>
-                <a:cs typeface="+mj-cs"/>
-              </a:defRPr>
-            </a:lvl1pPr>
-          </a:lstStyle>
-          <a:p>
-            <a:pPr algn="ctr"/>
-            <a:r>
-              <a:rPr lang="pt-BR" dirty="0">
-                <a:solidFill>
-                  <a:schemeClr val="tx1">
-                    <a:lumMod val="75000"/>
-                    <a:lumOff val="25000"/>
-                  </a:schemeClr>
-                </a:solidFill>
-                <a:latin typeface="Montserrat Medium" panose="00000600000000000000" pitchFamily="2" charset="0"/>
-              </a:rPr>
-              <a:t>LLD – </a:t>
-            </a:r>
-            <a:r>
-              <a:rPr lang="pt-BR" dirty="0" err="1">
-                <a:solidFill>
-                  <a:schemeClr val="tx1">
-                    <a:lumMod val="75000"/>
-                    <a:lumOff val="25000"/>
-                  </a:schemeClr>
-                </a:solidFill>
-                <a:latin typeface="Montserrat Medium" panose="00000600000000000000" pitchFamily="2" charset="0"/>
-              </a:rPr>
-              <a:t>Low</a:t>
-            </a:r>
-            <a:r>
-              <a:rPr lang="pt-BR" dirty="0">
-                <a:solidFill>
-                  <a:schemeClr val="tx1">
-                    <a:lumMod val="75000"/>
-                    <a:lumOff val="25000"/>
-                  </a:schemeClr>
-                </a:solidFill>
-                <a:latin typeface="Montserrat Medium" panose="00000600000000000000" pitchFamily="2" charset="0"/>
-              </a:rPr>
-              <a:t> </a:t>
-            </a:r>
-            <a:r>
-              <a:rPr lang="pt-BR" dirty="0" err="1">
-                <a:solidFill>
-                  <a:schemeClr val="tx1">
-                    <a:lumMod val="75000"/>
-                    <a:lumOff val="25000"/>
-                  </a:schemeClr>
-                </a:solidFill>
-                <a:latin typeface="Montserrat Medium" panose="00000600000000000000" pitchFamily="2" charset="0"/>
-              </a:rPr>
-              <a:t>Level</a:t>
-            </a:r>
-            <a:r>
-              <a:rPr lang="pt-BR" dirty="0">
-                <a:solidFill>
-                  <a:schemeClr val="tx1">
-                    <a:lumMod val="75000"/>
-                    <a:lumOff val="25000"/>
-                  </a:schemeClr>
-                </a:solidFill>
-                <a:latin typeface="Montserrat Medium" panose="00000600000000000000" pitchFamily="2" charset="0"/>
-              </a:rPr>
-              <a:t> Design</a:t>
-            </a:r>
-          </a:p>
-        </p:txBody>
-      </p:sp>
-      <p:pic>
-        <p:nvPicPr>
-          <p:cNvPr id="3" name="Imagem 2">
-            <a:extLst>
-              <a:ext uri="{FF2B5EF4-FFF2-40B4-BE49-F238E27FC236}">
-                <a16:creationId xmlns:a16="http://schemas.microsoft.com/office/drawing/2014/main" id="{9E3F6D08-1800-4A09-9630-CCAF671AC651}"/>
-              </a:ext>
-            </a:extLst>
-          </p:cNvPr>
-          <p:cNvPicPr>
-            <a:picLocks noChangeAspect="1"/>
-          </p:cNvPicPr>
-          <p:nvPr/>
-        </p:nvPicPr>
-        <p:blipFill>
-          <a:blip r:embed="rId2"/>
-          <a:stretch>
-            <a:fillRect/>
-          </a:stretch>
-        </p:blipFill>
-        <p:spPr>
-          <a:xfrm>
-            <a:off x="946985" y="1201000"/>
-            <a:ext cx="10298030" cy="5476025"/>
-          </a:xfrm>
-          <a:prstGeom prst="rect">
-            <a:avLst/>
-          </a:prstGeom>
-        </p:spPr>
-      </p:pic>
-    </p:spTree>
-    <p:extLst>
-      <p:ext uri="{BB962C8B-B14F-4D97-AF65-F5344CB8AC3E}">
-        <p14:creationId xmlns:p14="http://schemas.microsoft.com/office/powerpoint/2010/main" val="318295334"/>
-      </p:ext>
-    </p:extLst>
-  </p:cSld>
-  <p:clrMapOvr>
-    <a:masterClrMapping/>
-  </p:clrMapOvr>
-  <p:transition spd="slow">
-    <p:push dir="u"/>
-  </p:transition>
-</p:sld>
-</file>
-
-<file path=ppt/slides/slide4.xml><?xml version="1.0" encoding="utf-8"?>
 <p:sld xmlns:a="http://schemas.openxmlformats.org/drawingml/2006/main" xmlns:r="http://schemas.openxmlformats.org/officeDocument/2006/relationships" xmlns:p="http://schemas.openxmlformats.org/presentationml/2006/main">
   <p:cSld>
     <p:spTree>

</xml_diff>